<commit_message>
small updates on Sarah's slides
</commit_message>
<xml_diff>
--- a/report/Projet_classification_MLOps_SAKE.pptx
+++ b/report/Projet_classification_MLOps_SAKE.pptx
@@ -262,7 +262,7 @@
           <a:p>
             <a:fld id="{F352A77B-D33C-49B3-A83C-450AA2ED72B3}" type="datetimeFigureOut">
               <a:rPr lang="en-US" smtClean="0"/>
-              <a:t>2/23/2025</a:t>
+              <a:t>2/25/2025</a:t>
             </a:fld>
             <a:endParaRPr lang="en-US" dirty="0"/>
           </a:p>
@@ -340,7 +340,7 @@
           <a:p>
             <a:fld id="{4BF9A36D-7FAC-478F-9944-F324014F6FD1}" type="slidenum">
               <a:rPr lang="en-US" smtClean="0"/>
-              <a:t>‹N°›</a:t>
+              <a:t>‹#›</a:t>
             </a:fld>
             <a:endParaRPr lang="en-US" dirty="0"/>
           </a:p>
@@ -439,7 +439,7 @@
           <a:p>
             <a:fld id="{E38D8F9A-F5CB-4EF8-A859-ED5E107B9763}" type="datetimeFigureOut">
               <a:rPr lang="en-US" smtClean="0"/>
-              <a:t>2/23/2025</a:t>
+              <a:t>2/25/2025</a:t>
             </a:fld>
             <a:endParaRPr lang="en-US" dirty="0"/>
           </a:p>
@@ -597,7 +597,7 @@
           <a:p>
             <a:fld id="{D4B9A9E5-4F7F-4A7D-9DE1-899232329269}" type="slidenum">
               <a:rPr lang="en-US" smtClean="0"/>
-              <a:t>‹N°›</a:t>
+              <a:t>‹#›</a:t>
             </a:fld>
             <a:endParaRPr lang="en-US" dirty="0"/>
           </a:p>
@@ -966,7 +966,7 @@
           <a:p>
             <a:fld id="{B5CEABB6-07DC-46E8-9B57-56EC44A396E5}" type="slidenum">
               <a:rPr lang="en-US" smtClean="0"/>
-              <a:t>‹N°›</a:t>
+              <a:t>‹#›</a:t>
             </a:fld>
             <a:endParaRPr lang="en-US" dirty="0"/>
           </a:p>
@@ -1731,7 +1731,7 @@
             <a:fld id="{B5CEABB6-07DC-46E8-9B57-56EC44A396E5}" type="slidenum">
               <a:rPr lang="en-US" smtClean="0"/>
               <a:pPr/>
-              <a:t>‹N°›</a:t>
+              <a:t>‹#›</a:t>
             </a:fld>
             <a:endParaRPr lang="en-US" dirty="0"/>
           </a:p>
@@ -2557,7 +2557,7 @@
           <a:p>
             <a:fld id="{B5CEABB6-07DC-46E8-9B57-56EC44A396E5}" type="slidenum">
               <a:rPr lang="en-US" smtClean="0"/>
-              <a:t>‹N°›</a:t>
+              <a:t>‹#›</a:t>
             </a:fld>
             <a:endParaRPr lang="en-US" dirty="0"/>
           </a:p>
@@ -3658,7 +3658,7 @@
           <a:p>
             <a:fld id="{B5CEABB6-07DC-46E8-9B57-56EC44A396E5}" type="slidenum">
               <a:rPr lang="en-US" smtClean="0"/>
-              <a:t>‹N°›</a:t>
+              <a:t>‹#›</a:t>
             </a:fld>
             <a:endParaRPr lang="en-US" dirty="0"/>
           </a:p>
@@ -4214,7 +4214,7 @@
           <a:p>
             <a:fld id="{B5CEABB6-07DC-46E8-9B57-56EC44A396E5}" type="slidenum">
               <a:rPr lang="en-US" smtClean="0"/>
-              <a:t>‹N°›</a:t>
+              <a:t>‹#›</a:t>
             </a:fld>
             <a:endParaRPr lang="en-US" dirty="0"/>
           </a:p>
@@ -4813,7 +4813,7 @@
           <a:p>
             <a:fld id="{B5CEABB6-07DC-46E8-9B57-56EC44A396E5}" type="slidenum">
               <a:rPr lang="en-US" smtClean="0"/>
-              <a:t>‹N°›</a:t>
+              <a:t>‹#›</a:t>
             </a:fld>
             <a:endParaRPr lang="en-US" dirty="0"/>
           </a:p>
@@ -6296,7 +6296,7 @@
           <a:p>
             <a:fld id="{B5CEABB6-07DC-46E8-9B57-56EC44A396E5}" type="slidenum">
               <a:rPr lang="en-US" noProof="0" smtClean="0"/>
-              <a:t>‹N°›</a:t>
+              <a:t>‹#›</a:t>
             </a:fld>
             <a:endParaRPr lang="en-US" noProof="0" dirty="0"/>
           </a:p>
@@ -7365,7 +7365,7 @@
           <a:p>
             <a:fld id="{B5CEABB6-07DC-46E8-9B57-56EC44A396E5}" type="slidenum">
               <a:rPr lang="en-US" smtClean="0"/>
-              <a:t>‹N°›</a:t>
+              <a:t>‹#›</a:t>
             </a:fld>
             <a:endParaRPr lang="en-US" dirty="0"/>
           </a:p>
@@ -9279,7 +9279,7 @@
           <a:p>
             <a:fld id="{B5CEABB6-07DC-46E8-9B57-56EC44A396E5}" type="slidenum">
               <a:rPr lang="en-US" smtClean="0"/>
-              <a:t>‹N°›</a:t>
+              <a:t>‹#›</a:t>
             </a:fld>
             <a:endParaRPr lang="en-US" dirty="0"/>
           </a:p>
@@ -10799,7 +10799,7 @@
           <a:p>
             <a:fld id="{B5CEABB6-07DC-46E8-9B57-56EC44A396E5}" type="slidenum">
               <a:rPr lang="en-US" smtClean="0"/>
-              <a:t>‹N°›</a:t>
+              <a:t>‹#›</a:t>
             </a:fld>
             <a:endParaRPr lang="en-US" dirty="0"/>
           </a:p>
@@ -11129,7 +11129,7 @@
           <a:p>
             <a:fld id="{B5CEABB6-07DC-46E8-9B57-56EC44A396E5}" type="slidenum">
               <a:rPr lang="en-US" smtClean="0"/>
-              <a:t>‹N°›</a:t>
+              <a:t>‹#›</a:t>
             </a:fld>
             <a:endParaRPr lang="en-US" dirty="0"/>
           </a:p>
@@ -11713,7 +11713,7 @@
           <a:p>
             <a:fld id="{B5CEABB6-07DC-46E8-9B57-56EC44A396E5}" type="slidenum">
               <a:rPr lang="en-US" smtClean="0"/>
-              <a:t>‹N°›</a:t>
+              <a:t>‹#›</a:t>
             </a:fld>
             <a:endParaRPr lang="en-US" dirty="0"/>
           </a:p>
@@ -12037,7 +12037,7 @@
           <a:p>
             <a:fld id="{B5CEABB6-07DC-46E8-9B57-56EC44A396E5}" type="slidenum">
               <a:rPr lang="en-US" smtClean="0"/>
-              <a:t>‹N°›</a:t>
+              <a:t>‹#›</a:t>
             </a:fld>
             <a:endParaRPr lang="en-US" dirty="0"/>
           </a:p>
@@ -12311,7 +12311,7 @@
           <a:p>
             <a:fld id="{B5CEABB6-07DC-46E8-9B57-56EC44A396E5}" type="slidenum">
               <a:rPr lang="en-US" smtClean="0"/>
-              <a:t>‹N°›</a:t>
+              <a:t>‹#›</a:t>
             </a:fld>
             <a:endParaRPr lang="en-US" dirty="0"/>
           </a:p>
@@ -12672,7 +12672,7 @@
           <a:p>
             <a:fld id="{B5CEABB6-07DC-46E8-9B57-56EC44A396E5}" type="slidenum">
               <a:rPr lang="en-US" smtClean="0"/>
-              <a:t>‹N°›</a:t>
+              <a:t>‹#›</a:t>
             </a:fld>
             <a:endParaRPr lang="en-US" dirty="0"/>
           </a:p>
@@ -13347,7 +13347,7 @@
           <a:p>
             <a:fld id="{B5CEABB6-07DC-46E8-9B57-56EC44A396E5}" type="slidenum">
               <a:rPr lang="en-US" smtClean="0"/>
-              <a:t>‹N°›</a:t>
+              <a:t>‹#›</a:t>
             </a:fld>
             <a:endParaRPr lang="en-US" dirty="0"/>
           </a:p>
@@ -14145,7 +14145,7 @@
           <a:p>
             <a:fld id="{B5CEABB6-07DC-46E8-9B57-56EC44A396E5}" type="slidenum">
               <a:rPr lang="en-US" smtClean="0"/>
-              <a:t>‹N°›</a:t>
+              <a:t>‹#›</a:t>
             </a:fld>
             <a:endParaRPr lang="en-US" dirty="0"/>
           </a:p>
@@ -14733,7 +14733,7 @@
           <a:p>
             <a:fld id="{B5CEABB6-07DC-46E8-9B57-56EC44A396E5}" type="slidenum">
               <a:rPr lang="en-US" smtClean="0"/>
-              <a:t>‹N°›</a:t>
+              <a:t>‹#›</a:t>
             </a:fld>
             <a:endParaRPr lang="en-US" dirty="0"/>
           </a:p>
@@ -15414,7 +15414,7 @@
             <a:fld id="{B5CEABB6-07DC-46E8-9B57-56EC44A396E5}" type="slidenum">
               <a:rPr lang="en-US" smtClean="0"/>
               <a:pPr/>
-              <a:t>‹N°›</a:t>
+              <a:t>‹#›</a:t>
             </a:fld>
             <a:endParaRPr lang="en-US" dirty="0"/>
           </a:p>
@@ -15862,7 +15862,7 @@
           <a:p>
             <a:fld id="{B5CEABB6-07DC-46E8-9B57-56EC44A396E5}" type="slidenum">
               <a:rPr lang="en-US" smtClean="0"/>
-              <a:t>‹N°›</a:t>
+              <a:t>‹#›</a:t>
             </a:fld>
             <a:endParaRPr lang="en-US" dirty="0"/>
           </a:p>
@@ -16148,7 +16148,7 @@
             <a:fld id="{B5CEABB6-07DC-46E8-9B57-56EC44A396E5}" type="slidenum">
               <a:rPr lang="en-US" smtClean="0"/>
               <a:pPr/>
-              <a:t>‹N°›</a:t>
+              <a:t>‹#›</a:t>
             </a:fld>
             <a:endParaRPr lang="en-US" dirty="0"/>
           </a:p>
@@ -16919,18 +16919,7 @@
           </a:p>
           <a:p>
             <a:pPr lvl="1"/>
-            <a:r>
-              <a:rPr lang="fr-FR" dirty="0"/>
-              <a:t>Gestion des données dans une </a:t>
-            </a:r>
-            <a:r>
-              <a:rPr lang="fr-FR" b="1" dirty="0"/>
-              <a:t>branche /Prod </a:t>
-            </a:r>
-            <a:r>
-              <a:rPr lang="fr-FR" dirty="0"/>
-              <a:t>sous Git</a:t>
-            </a:r>
+            <a:endParaRPr lang="fr-FR" dirty="0"/>
           </a:p>
           <a:p>
             <a:pPr lvl="1"/>
@@ -20711,8 +20700,8 @@
         </p:nvSpPr>
         <p:spPr>
           <a:xfrm>
-            <a:off x="8077200" y="2182075"/>
-            <a:ext cx="4114800" cy="3477362"/>
+            <a:off x="8461513" y="1451818"/>
+            <a:ext cx="4114800" cy="4666919"/>
           </a:xfrm>
           <a:prstGeom prst="rect">
             <a:avLst/>
@@ -20753,15 +20742,15 @@
             </a:r>
           </a:p>
           <a:p>
-            <a:pPr marL="685800" lvl="1" indent="-228600">
+            <a:pPr marL="342900" indent="-342900">
               <a:lnSpc>
                 <a:spcPct val="90000"/>
               </a:lnSpc>
               <a:spcBef>
                 <a:spcPts val="500"/>
               </a:spcBef>
-              <a:buFont typeface="Courier New" panose="02070309020205020404" pitchFamily="49" charset="0"/>
-              <a:buChar char="o"/>
+              <a:buFont typeface="Arial" panose="020B0604020202020204" pitchFamily="34" charset="0"/>
+              <a:buChar char="•"/>
               <a:defRPr/>
             </a:pPr>
             <a:r>
@@ -20771,19 +20760,19 @@
                 </a:solidFill>
                 <a:latin typeface="Tenorite"/>
               </a:rPr>
-              <a:t>état des services</a:t>
-            </a:r>
-          </a:p>
-          <a:p>
-            <a:pPr marL="685800" lvl="1" indent="-228600">
+              <a:t> Etat des services </a:t>
+            </a:r>
+          </a:p>
+          <a:p>
+            <a:pPr marL="342900" indent="-342900">
               <a:lnSpc>
                 <a:spcPct val="90000"/>
               </a:lnSpc>
               <a:spcBef>
                 <a:spcPts val="500"/>
               </a:spcBef>
-              <a:buFont typeface="Courier New" panose="02070309020205020404" pitchFamily="49" charset="0"/>
-              <a:buChar char="o"/>
+              <a:buFont typeface="Arial" panose="020B0604020202020204" pitchFamily="34" charset="0"/>
+              <a:buChar char="•"/>
               <a:defRPr/>
             </a:pPr>
             <a:r>
@@ -20801,17 +20790,25 @@
                 <a:ea typeface="+mn-ea"/>
                 <a:cs typeface="+mn-cs"/>
               </a:rPr>
-              <a:t>nombre de requêtes</a:t>
-            </a:r>
-          </a:p>
-          <a:p>
-            <a:pPr>
+              <a:t> Nombre de requêtes</a:t>
+            </a:r>
+            <a:endParaRPr lang="fr-FR" sz="2400" dirty="0">
+              <a:solidFill>
+                <a:prstClr val="black"/>
+              </a:solidFill>
+              <a:latin typeface="Tenorite"/>
+            </a:endParaRPr>
+          </a:p>
+          <a:p>
+            <a:pPr marL="342900" indent="-342900">
               <a:lnSpc>
                 <a:spcPct val="90000"/>
               </a:lnSpc>
               <a:spcBef>
                 <a:spcPts val="500"/>
               </a:spcBef>
+              <a:buFont typeface="Arial" panose="020B0604020202020204" pitchFamily="34" charset="0"/>
+              <a:buChar char="•"/>
               <a:defRPr/>
             </a:pPr>
             <a:r>
@@ -20829,19 +20826,51 @@
                 <a:ea typeface="+mn-ea"/>
                 <a:cs typeface="+mn-cs"/>
               </a:rPr>
-              <a:t>Les seuils de détection</a:t>
-            </a:r>
-          </a:p>
-          <a:p>
-            <a:pPr marL="685800" lvl="1" indent="-228600">
+              <a:t> </a:t>
+            </a:r>
+            <a:r>
+              <a:rPr lang="fr-FR" sz="2400" dirty="0">
+                <a:solidFill>
+                  <a:prstClr val="black"/>
+                </a:solidFill>
+                <a:latin typeface="Tenorite"/>
+              </a:rPr>
+              <a:t>Délai de réponse</a:t>
+            </a:r>
+          </a:p>
+          <a:p>
+            <a:pPr>
               <a:lnSpc>
                 <a:spcPct val="90000"/>
               </a:lnSpc>
               <a:spcBef>
                 <a:spcPts val="500"/>
               </a:spcBef>
-              <a:buFont typeface="Courier New" panose="02070309020205020404" pitchFamily="49" charset="0"/>
-              <a:buChar char="o"/>
+              <a:defRPr/>
+            </a:pPr>
+            <a:endParaRPr kumimoji="0" lang="fr-FR" sz="2400" b="0" i="0" u="none" strike="noStrike" kern="1200" cap="none" spc="0" normalizeH="0" baseline="0" noProof="0" dirty="0">
+              <a:ln>
+                <a:noFill/>
+              </a:ln>
+              <a:solidFill>
+                <a:prstClr val="black"/>
+              </a:solidFill>
+              <a:effectLst/>
+              <a:uLnTx/>
+              <a:uFillTx/>
+              <a:latin typeface="Tenorite"/>
+              <a:ea typeface="+mn-ea"/>
+              <a:cs typeface="+mn-cs"/>
+            </a:endParaRPr>
+          </a:p>
+          <a:p>
+            <a:pPr>
+              <a:lnSpc>
+                <a:spcPct val="90000"/>
+              </a:lnSpc>
+              <a:spcBef>
+                <a:spcPts val="500"/>
+              </a:spcBef>
               <a:defRPr/>
             </a:pPr>
             <a:r>
@@ -20859,8 +20888,55 @@
                 <a:ea typeface="+mn-ea"/>
                 <a:cs typeface="+mn-cs"/>
               </a:rPr>
-              <a:t>1m down</a:t>
-            </a:r>
+              <a:t>Les seuils de détection :</a:t>
+            </a:r>
+          </a:p>
+          <a:p>
+            <a:pPr marL="342900" indent="-342900">
+              <a:lnSpc>
+                <a:spcPct val="90000"/>
+              </a:lnSpc>
+              <a:spcBef>
+                <a:spcPts val="500"/>
+              </a:spcBef>
+              <a:buFont typeface="Arial" panose="020B0604020202020204" pitchFamily="34" charset="0"/>
+              <a:buChar char="•"/>
+              <a:defRPr/>
+            </a:pPr>
+            <a:r>
+              <a:rPr lang="fr-FR" sz="2400" dirty="0">
+                <a:solidFill>
+                  <a:prstClr val="black"/>
+                </a:solidFill>
+                <a:latin typeface="Tenorite"/>
+              </a:rPr>
+              <a:t>  Si down &gt; 10s</a:t>
+            </a:r>
+          </a:p>
+          <a:p>
+            <a:pPr>
+              <a:lnSpc>
+                <a:spcPct val="90000"/>
+              </a:lnSpc>
+              <a:spcBef>
+                <a:spcPts val="500"/>
+              </a:spcBef>
+              <a:defRPr/>
+            </a:pPr>
+            <a:endParaRPr kumimoji="0" lang="fr-FR" sz="2400" b="0" i="0" u="none" strike="noStrike" kern="1200" cap="none" spc="0" normalizeH="0" baseline="0" noProof="0" dirty="0">
+              <a:ln>
+                <a:noFill/>
+              </a:ln>
+              <a:solidFill>
+                <a:prstClr val="black"/>
+              </a:solidFill>
+              <a:effectLst/>
+              <a:uLnTx/>
+              <a:uFillTx/>
+              <a:latin typeface="Tenorite"/>
+              <a:ea typeface="+mn-ea"/>
+              <a:cs typeface="+mn-cs"/>
+            </a:endParaRPr>
           </a:p>
           <a:p>
             <a:pPr>
@@ -20887,25 +20963,21 @@
                 <a:ea typeface="+mn-ea"/>
                 <a:cs typeface="+mn-cs"/>
               </a:rPr>
-              <a:t>Les alertes (</a:t>
-            </a:r>
-            <a:r>
-              <a:rPr kumimoji="0" lang="fr-FR" sz="2400" b="0" i="0" u="none" strike="noStrike" kern="1200" cap="none" spc="0" normalizeH="0" baseline="0" noProof="0" dirty="0" err="1">
-                <a:ln>
-                  <a:noFill/>
-                </a:ln>
-                <a:solidFill>
-                  <a:prstClr val="black"/>
-                </a:solidFill>
-                <a:effectLst/>
-                <a:uLnTx/>
-                <a:uFillTx/>
-                <a:latin typeface="Tenorite"/>
-                <a:ea typeface="+mn-ea"/>
-                <a:cs typeface="+mn-cs"/>
-              </a:rPr>
-              <a:t>metric</a:t>
-            </a:r>
+              <a:t>Les alertes :</a:t>
+            </a:r>
+          </a:p>
+          <a:p>
+            <a:pPr marL="342900" indent="-342900">
+              <a:lnSpc>
+                <a:spcPct val="90000"/>
+              </a:lnSpc>
+              <a:spcBef>
+                <a:spcPts val="500"/>
+              </a:spcBef>
+              <a:buFont typeface="Arial" panose="020B0604020202020204" pitchFamily="34" charset="0"/>
+              <a:buChar char="•"/>
+              <a:defRPr/>
+            </a:pPr>
             <a:r>
               <a:rPr kumimoji="0" lang="fr-FR" sz="2400" b="0" i="0" u="none" strike="noStrike" kern="1200" cap="none" spc="0" normalizeH="0" baseline="0" noProof="0" dirty="0">
                 <a:ln>
@@ -20921,37 +20993,7 @@
                 <a:ea typeface="+mn-ea"/>
                 <a:cs typeface="+mn-cs"/>
               </a:rPr>
-              <a:t> drift)</a:t>
-            </a:r>
-          </a:p>
-          <a:p>
-            <a:pPr marL="685800" lvl="1" indent="-228600">
-              <a:lnSpc>
-                <a:spcPct val="90000"/>
-              </a:lnSpc>
-              <a:spcBef>
-                <a:spcPts val="500"/>
-              </a:spcBef>
-              <a:buFont typeface="Courier New" panose="02070309020205020404" pitchFamily="49" charset="0"/>
-              <a:buChar char="o"/>
-              <a:defRPr/>
-            </a:pPr>
-            <a:r>
-              <a:rPr kumimoji="0" lang="fr-FR" sz="2400" b="0" i="0" u="none" strike="noStrike" kern="1200" cap="none" spc="0" normalizeH="0" baseline="0" noProof="0" dirty="0">
-                <a:ln>
-                  <a:noFill/>
-                </a:ln>
-                <a:solidFill>
-                  <a:prstClr val="black"/>
-                </a:solidFill>
-                <a:effectLst/>
-                <a:uLnTx/>
-                <a:uFillTx/>
-                <a:latin typeface="Tenorite"/>
-                <a:ea typeface="+mn-ea"/>
-                <a:cs typeface="+mn-cs"/>
-              </a:rPr>
-              <a:t>down </a:t>
+              <a:t> Si service down </a:t>
             </a:r>
             <a:r>
               <a:rPr lang="fr-FR" sz="2400" dirty="0">
@@ -47714,6 +47756,26 @@
 </file>
 
 <file path=customXml/item1.xml><?xml version="1.0" encoding="utf-8"?>
+<p:properties xmlns:p="http://schemas.microsoft.com/office/2006/metadata/properties" xmlns:xsi="http://www.w3.org/2001/XMLSchema-instance" xmlns:pc="http://schemas.microsoft.com/office/infopath/2007/PartnerControls">
+  <documentManagement>
+    <_ip_UnifiedCompliancePolicyUIAction xmlns="http://schemas.microsoft.com/sharepoint/v3" xsi:nil="true"/>
+    <Image xmlns="71af3243-3dd4-4a8d-8c0d-dd76da1f02a5">
+      <Url xsi:nil="true"/>
+      <Description xsi:nil="true"/>
+    </Image>
+    <Status xmlns="71af3243-3dd4-4a8d-8c0d-dd76da1f02a5">Not started</Status>
+    <Background xmlns="71af3243-3dd4-4a8d-8c0d-dd76da1f02a5">false</Background>
+    <_ip_UnifiedCompliancePolicyProperties xmlns="http://schemas.microsoft.com/sharepoint/v3" xsi:nil="true"/>
+    <ImageTagsTaxHTField xmlns="71af3243-3dd4-4a8d-8c0d-dd76da1f02a5">
+      <Terms xmlns="http://schemas.microsoft.com/office/infopath/2007/PartnerControls"/>
+    </ImageTagsTaxHTField>
+    <TaxCatchAll xmlns="230e9df3-be65-4c73-a93b-d1236ebd677e" xsi:nil="true"/>
+    <MediaServiceKeyPoints xmlns="71af3243-3dd4-4a8d-8c0d-dd76da1f02a5" xsi:nil="true"/>
+  </documentManagement>
+</p:properties>
+</file>
+
+<file path=customXml/item2.xml><?xml version="1.0" encoding="utf-8"?>
 <ct:contentTypeSchema xmlns:ct="http://schemas.microsoft.com/office/2006/metadata/contentType" xmlns:ma="http://schemas.microsoft.com/office/2006/metadata/properties/metaAttributes" ct:_="" ma:_="" ma:contentTypeName="Document" ma:contentTypeID="0x01010079F111ED35F8CC479449609E8A0923A6" ma:contentTypeVersion="27" ma:contentTypeDescription="Create a new document." ma:contentTypeScope="" ma:versionID="c6f9a84f66a9c8b9a21755b9ffafb945">
   <xsd:schema xmlns:xsd="http://www.w3.org/2001/XMLSchema" xmlns:xs="http://www.w3.org/2001/XMLSchema" xmlns:p="http://schemas.microsoft.com/office/2006/metadata/properties" xmlns:ns1="http://schemas.microsoft.com/sharepoint/v3" xmlns:ns2="71af3243-3dd4-4a8d-8c0d-dd76da1f02a5" xmlns:ns3="16c05727-aa75-4e4a-9b5f-8a80a1165891" xmlns:ns4="230e9df3-be65-4c73-a93b-d1236ebd677e" targetNamespace="http://schemas.microsoft.com/office/2006/metadata/properties" ma:root="true" ma:fieldsID="27df39e3e7036dff54f89ddd5805ce72" ns1:_="" ns2:_="" ns3:_="" ns4:_="">
     <xsd:import namespace="http://schemas.microsoft.com/sharepoint/v3"/>
@@ -48019,26 +48081,6 @@
 </ct:contentTypeSchema>
 </file>
 
-<file path=customXml/item2.xml><?xml version="1.0" encoding="utf-8"?>
-<p:properties xmlns:p="http://schemas.microsoft.com/office/2006/metadata/properties" xmlns:xsi="http://www.w3.org/2001/XMLSchema-instance" xmlns:pc="http://schemas.microsoft.com/office/infopath/2007/PartnerControls">
-  <documentManagement>
-    <_ip_UnifiedCompliancePolicyUIAction xmlns="http://schemas.microsoft.com/sharepoint/v3" xsi:nil="true"/>
-    <Image xmlns="71af3243-3dd4-4a8d-8c0d-dd76da1f02a5">
-      <Url xsi:nil="true"/>
-      <Description xsi:nil="true"/>
-    </Image>
-    <Status xmlns="71af3243-3dd4-4a8d-8c0d-dd76da1f02a5">Not started</Status>
-    <Background xmlns="71af3243-3dd4-4a8d-8c0d-dd76da1f02a5">false</Background>
-    <_ip_UnifiedCompliancePolicyProperties xmlns="http://schemas.microsoft.com/sharepoint/v3" xsi:nil="true"/>
-    <ImageTagsTaxHTField xmlns="71af3243-3dd4-4a8d-8c0d-dd76da1f02a5">
-      <Terms xmlns="http://schemas.microsoft.com/office/infopath/2007/PartnerControls"/>
-    </ImageTagsTaxHTField>
-    <TaxCatchAll xmlns="230e9df3-be65-4c73-a93b-d1236ebd677e" xsi:nil="true"/>
-    <MediaServiceKeyPoints xmlns="71af3243-3dd4-4a8d-8c0d-dd76da1f02a5" xsi:nil="true"/>
-  </documentManagement>
-</p:properties>
-</file>
-
 <file path=customXml/item3.xml><?xml version="1.0" encoding="utf-8"?>
 <?mso-contentType ?>
 <FormTemplates xmlns="http://schemas.microsoft.com/sharepoint/v3/contenttype/forms">
@@ -48049,6 +48091,18 @@
 </file>
 
 <file path=customXml/itemProps1.xml><?xml version="1.0" encoding="utf-8"?>
+<ds:datastoreItem xmlns:ds="http://schemas.openxmlformats.org/officeDocument/2006/customXml" ds:itemID="{6EA97235-BEC4-4F82-87A8-2F5DAD53B5F9}">
+  <ds:schemaRefs>
+    <ds:schemaRef ds:uri="http://schemas.microsoft.com/office/2006/metadata/properties"/>
+    <ds:schemaRef ds:uri="http://schemas.microsoft.com/office/infopath/2007/PartnerControls"/>
+    <ds:schemaRef ds:uri="http://schemas.microsoft.com/sharepoint/v3"/>
+    <ds:schemaRef ds:uri="71af3243-3dd4-4a8d-8c0d-dd76da1f02a5"/>
+    <ds:schemaRef ds:uri="230e9df3-be65-4c73-a93b-d1236ebd677e"/>
+  </ds:schemaRefs>
+</ds:datastoreItem>
+</file>
+
+<file path=customXml/itemProps2.xml><?xml version="1.0" encoding="utf-8"?>
 <ds:datastoreItem xmlns:ds="http://schemas.openxmlformats.org/officeDocument/2006/customXml" ds:itemID="{2C1F447F-FAA8-4106-988B-648F3C8EDB2D}">
   <ds:schemaRefs>
     <ds:schemaRef ds:uri="http://schemas.microsoft.com/office/2006/metadata/contentType"/>
@@ -48069,18 +48123,6 @@
 </ds:datastoreItem>
 </file>
 
-<file path=customXml/itemProps2.xml><?xml version="1.0" encoding="utf-8"?>
-<ds:datastoreItem xmlns:ds="http://schemas.openxmlformats.org/officeDocument/2006/customXml" ds:itemID="{6EA97235-BEC4-4F82-87A8-2F5DAD53B5F9}">
-  <ds:schemaRefs>
-    <ds:schemaRef ds:uri="http://schemas.microsoft.com/office/2006/metadata/properties"/>
-    <ds:schemaRef ds:uri="http://schemas.microsoft.com/office/infopath/2007/PartnerControls"/>
-    <ds:schemaRef ds:uri="http://schemas.microsoft.com/sharepoint/v3"/>
-    <ds:schemaRef ds:uri="71af3243-3dd4-4a8d-8c0d-dd76da1f02a5"/>
-    <ds:schemaRef ds:uri="230e9df3-be65-4c73-a93b-d1236ebd677e"/>
-  </ds:schemaRefs>
-</ds:datastoreItem>
-</file>
-
 <file path=customXml/itemProps3.xml><?xml version="1.0" encoding="utf-8"?>
 <ds:datastoreItem xmlns:ds="http://schemas.openxmlformats.org/officeDocument/2006/customXml" ds:itemID="{79BF405E-7930-4D5C-ABB3-493E9D6D6CEA}">
   <ds:schemaRefs>

</xml_diff>

<commit_message>
mise à jour des slides (last updates)
</commit_message>
<xml_diff>
--- a/report/Projet_classification_MLOps_SAKE.pptx
+++ b/report/Projet_classification_MLOps_SAKE.pptx
@@ -5,10 +5,10 @@
     <p:sldMasterId id="2147483666" r:id="rId4"/>
   </p:sldMasterIdLst>
   <p:notesMasterIdLst>
-    <p:notesMasterId r:id="rId30"/>
+    <p:notesMasterId r:id="rId31"/>
   </p:notesMasterIdLst>
   <p:handoutMasterIdLst>
-    <p:handoutMasterId r:id="rId31"/>
+    <p:handoutMasterId r:id="rId32"/>
   </p:handoutMasterIdLst>
   <p:sldIdLst>
     <p:sldId id="256" r:id="rId5"/>
@@ -20,8 +20,8 @@
     <p:sldId id="285" r:id="rId11"/>
     <p:sldId id="292" r:id="rId12"/>
     <p:sldId id="287" r:id="rId13"/>
-    <p:sldId id="293" r:id="rId14"/>
-    <p:sldId id="294" r:id="rId15"/>
+    <p:sldId id="308" r:id="rId14"/>
+    <p:sldId id="309" r:id="rId15"/>
     <p:sldId id="295" r:id="rId16"/>
     <p:sldId id="296" r:id="rId17"/>
     <p:sldId id="297" r:id="rId18"/>
@@ -36,6 +36,7 @@
     <p:sldId id="305" r:id="rId27"/>
     <p:sldId id="306" r:id="rId28"/>
     <p:sldId id="307" r:id="rId29"/>
+    <p:sldId id="281" r:id="rId30"/>
   </p:sldIdLst>
   <p:sldSz cx="12192000" cy="6858000"/>
   <p:notesSz cx="6858000" cy="9144000"/>
@@ -262,7 +263,7 @@
           <a:p>
             <a:fld id="{F352A77B-D33C-49B3-A83C-450AA2ED72B3}" type="datetimeFigureOut">
               <a:rPr lang="en-US" smtClean="0"/>
-              <a:t>2/23/2025</a:t>
+              <a:t>2/25/2025</a:t>
             </a:fld>
             <a:endParaRPr lang="en-US" dirty="0"/>
           </a:p>
@@ -439,7 +440,7 @@
           <a:p>
             <a:fld id="{E38D8F9A-F5CB-4EF8-A859-ED5E107B9763}" type="datetimeFigureOut">
               <a:rPr lang="en-US" smtClean="0"/>
-              <a:t>2/23/2025</a:t>
+              <a:t>2/25/2025</a:t>
             </a:fld>
             <a:endParaRPr lang="en-US" dirty="0"/>
           </a:p>
@@ -16919,18 +16920,7 @@
           </a:p>
           <a:p>
             <a:pPr lvl="1"/>
-            <a:r>
-              <a:rPr lang="fr-FR" dirty="0"/>
-              <a:t>Gestion des données dans une </a:t>
-            </a:r>
-            <a:r>
-              <a:rPr lang="fr-FR" b="1" dirty="0"/>
-              <a:t>branche /Prod </a:t>
-            </a:r>
-            <a:r>
-              <a:rPr lang="fr-FR" dirty="0"/>
-              <a:t>sous Git</a:t>
-            </a:r>
+            <a:endParaRPr lang="fr-FR" dirty="0"/>
           </a:p>
           <a:p>
             <a:pPr lvl="1"/>
@@ -18640,7 +18630,7 @@
     </p:spTree>
     <p:extLst>
       <p:ext uri="{BB962C8B-B14F-4D97-AF65-F5344CB8AC3E}">
-        <p14:creationId xmlns:p14="http://schemas.microsoft.com/office/powerpoint/2010/main" val="2449761722"/>
+        <p14:creationId xmlns:p14="http://schemas.microsoft.com/office/powerpoint/2010/main" val="821332728"/>
       </p:ext>
     </p:extLst>
   </p:cSld>
@@ -19933,7 +19923,7 @@
     </p:spTree>
     <p:extLst>
       <p:ext uri="{BB962C8B-B14F-4D97-AF65-F5344CB8AC3E}">
-        <p14:creationId xmlns:p14="http://schemas.microsoft.com/office/powerpoint/2010/main" val="4093655772"/>
+        <p14:creationId xmlns:p14="http://schemas.microsoft.com/office/powerpoint/2010/main" val="3762562247"/>
       </p:ext>
     </p:extLst>
   </p:cSld>
@@ -21415,13 +21405,20 @@
           <a:p>
             <a:r>
               <a:rPr lang="fr-FR" b="1" dirty="0"/>
-              <a:t>Pipeline Prédiction &amp; Feedback User (Time </a:t>
-            </a:r>
-            <a:r>
-              <a:rPr lang="fr-FR" b="1"/>
-              <a:t>12 minutes)</a:t>
-            </a:r>
-            <a:endParaRPr lang="fr-FR" b="1" dirty="0"/>
+              <a:t>Pipeline Prédiction &amp; Feedback User </a:t>
+            </a:r>
+            <a:r>
+              <a:rPr lang="fr-FR" dirty="0"/>
+              <a:t>(</a:t>
+            </a:r>
+            <a:r>
+              <a:rPr lang="fr-FR" dirty="0" err="1"/>
+              <a:t>Remain</a:t>
+            </a:r>
+            <a:r>
+              <a:rPr lang="fr-FR" dirty="0"/>
+              <a:t> 8 minutes)</a:t>
+            </a:r>
           </a:p>
           <a:p>
             <a:r>
@@ -21432,18 +21429,7 @@
               <a:rPr lang="fr-FR" dirty="0" err="1"/>
               <a:t>MLOps</a:t>
             </a:r>
-            <a:r>
-              <a:rPr lang="fr-FR" dirty="0"/>
-              <a:t> (CI/CD, </a:t>
-            </a:r>
-            <a:r>
-              <a:rPr lang="fr-FR" dirty="0" err="1"/>
-              <a:t>Kubernetes</a:t>
-            </a:r>
-            <a:r>
-              <a:rPr lang="fr-FR" dirty="0"/>
-              <a:t>, Sécurisation)</a:t>
-            </a:r>
+            <a:endParaRPr lang="fr-FR" dirty="0"/>
           </a:p>
         </p:txBody>
       </p:sp>
@@ -29415,7 +29401,19 @@
             </a:r>
             <a:r>
               <a:rPr lang="fr-FR" b="1" dirty="0"/>
-              <a:t>, Sécurisation) (Time 16 min)</a:t>
+              <a:t>, Sécurisation) </a:t>
+            </a:r>
+            <a:r>
+              <a:rPr lang="fr-FR" dirty="0"/>
+              <a:t>(</a:t>
+            </a:r>
+            <a:r>
+              <a:rPr lang="fr-FR" dirty="0" err="1"/>
+              <a:t>Remain</a:t>
+            </a:r>
+            <a:r>
+              <a:rPr lang="fr-FR" dirty="0"/>
+              <a:t> 4 min)</a:t>
             </a:r>
           </a:p>
         </p:txBody>
@@ -33852,6 +33850,273 @@
 </p:sld>
 </file>
 
+<file path=ppt/slides/slide26.xml><?xml version="1.0" encoding="utf-8"?>
+<p:sld xmlns:a="http://schemas.openxmlformats.org/drawingml/2006/main" xmlns:r="http://schemas.openxmlformats.org/officeDocument/2006/relationships" xmlns:p="http://schemas.openxmlformats.org/presentationml/2006/main">
+  <p:cSld>
+    <p:spTree>
+      <p:nvGrpSpPr>
+        <p:cNvPr id="1" name=""/>
+        <p:cNvGrpSpPr/>
+        <p:nvPr/>
+      </p:nvGrpSpPr>
+      <p:grpSpPr>
+        <a:xfrm>
+          <a:off x="0" y="0"/>
+          <a:ext cx="0" cy="0"/>
+          <a:chOff x="0" y="0"/>
+          <a:chExt cx="0" cy="0"/>
+        </a:xfrm>
+      </p:grpSpPr>
+      <p:sp>
+        <p:nvSpPr>
+          <p:cNvPr id="2" name="Titre 1">
+            <a:extLst>
+              <a:ext uri="{FF2B5EF4-FFF2-40B4-BE49-F238E27FC236}">
+                <a16:creationId xmlns:a16="http://schemas.microsoft.com/office/drawing/2014/main" id="{7FCA4961-A836-37CA-7FD9-4ABAA922B55B}"/>
+              </a:ext>
+            </a:extLst>
+          </p:cNvPr>
+          <p:cNvSpPr>
+            <a:spLocks noGrp="1"/>
+          </p:cNvSpPr>
+          <p:nvPr>
+            <p:ph type="ctrTitle"/>
+          </p:nvPr>
+        </p:nvSpPr>
+        <p:spPr>
+          <a:xfrm>
+            <a:off x="3802752" y="904692"/>
+            <a:ext cx="7952473" cy="711044"/>
+          </a:xfrm>
+        </p:spPr>
+        <p:txBody>
+          <a:bodyPr/>
+          <a:lstStyle/>
+          <a:p>
+            <a:r>
+              <a:rPr lang="fr-FR" sz="4800" dirty="0"/>
+              <a:t>MERCI de votre attention !</a:t>
+            </a:r>
+            <a:endParaRPr lang="en-US" sz="4800" dirty="0"/>
+          </a:p>
+        </p:txBody>
+      </p:sp>
+      <p:sp>
+        <p:nvSpPr>
+          <p:cNvPr id="3" name="Sous-titre 2">
+            <a:extLst>
+              <a:ext uri="{FF2B5EF4-FFF2-40B4-BE49-F238E27FC236}">
+                <a16:creationId xmlns:a16="http://schemas.microsoft.com/office/drawing/2014/main" id="{3E024D6C-8F2F-2488-B295-9C0C7E54D9F3}"/>
+              </a:ext>
+            </a:extLst>
+          </p:cNvPr>
+          <p:cNvSpPr>
+            <a:spLocks noGrp="1"/>
+          </p:cNvSpPr>
+          <p:nvPr>
+            <p:ph type="subTitle" idx="1"/>
+          </p:nvPr>
+        </p:nvSpPr>
+        <p:spPr>
+          <a:xfrm>
+            <a:off x="3802751" y="1981881"/>
+            <a:ext cx="8141009" cy="3971427"/>
+          </a:xfrm>
+        </p:spPr>
+        <p:txBody>
+          <a:bodyPr>
+            <a:normAutofit fontScale="92500" lnSpcReduction="10000"/>
+          </a:bodyPr>
+          <a:lstStyle/>
+          <a:p>
+            <a:r>
+              <a:rPr lang="fr-FR" sz="3900" b="1" dirty="0"/>
+              <a:t>Avez-vous des questions ?</a:t>
+            </a:r>
+          </a:p>
+          <a:p>
+            <a:pPr>
+              <a:lnSpc>
+                <a:spcPct val="110000"/>
+              </a:lnSpc>
+            </a:pPr>
+            <a:r>
+              <a:rPr lang="fr-FR" sz="3200" dirty="0"/>
+              <a:t>Nous pouvons vous montrer en live:</a:t>
+            </a:r>
+          </a:p>
+          <a:p>
+            <a:pPr marL="457200" indent="-457200">
+              <a:lnSpc>
+                <a:spcPct val="110000"/>
+              </a:lnSpc>
+              <a:buFont typeface="Arial" panose="020B0604020202020204" pitchFamily="34" charset="0"/>
+              <a:buChar char="•"/>
+            </a:pPr>
+            <a:r>
+              <a:rPr lang="fr-FR" sz="3200" dirty="0"/>
+              <a:t>La documentation du projet sur GitHub</a:t>
+            </a:r>
+          </a:p>
+          <a:p>
+            <a:pPr marL="457200" indent="-457200">
+              <a:lnSpc>
+                <a:spcPct val="110000"/>
+              </a:lnSpc>
+              <a:buFont typeface="Arial" panose="020B0604020202020204" pitchFamily="34" charset="0"/>
+              <a:buChar char="•"/>
+            </a:pPr>
+            <a:r>
+              <a:rPr lang="fr-FR" sz="3200" dirty="0"/>
+              <a:t>Les 3 interfaces en Local | en </a:t>
+            </a:r>
+            <a:r>
+              <a:rPr lang="fr-FR" sz="3200" dirty="0" err="1"/>
+              <a:t>Remote</a:t>
+            </a:r>
+            <a:endParaRPr lang="fr-FR" sz="3200" dirty="0"/>
+          </a:p>
+          <a:p>
+            <a:pPr marL="457200" indent="-457200">
+              <a:lnSpc>
+                <a:spcPct val="110000"/>
+              </a:lnSpc>
+              <a:buFont typeface="Arial" panose="020B0604020202020204" pitchFamily="34" charset="0"/>
+              <a:buChar char="•"/>
+            </a:pPr>
+            <a:r>
+              <a:rPr lang="fr-FR" sz="3200" dirty="0"/>
+              <a:t>Le repo source | Le repo de déploiement</a:t>
+            </a:r>
+          </a:p>
+          <a:p>
+            <a:pPr marL="457200" indent="-457200">
+              <a:lnSpc>
+                <a:spcPct val="110000"/>
+              </a:lnSpc>
+              <a:buFont typeface="Arial" panose="020B0604020202020204" pitchFamily="34" charset="0"/>
+              <a:buChar char="•"/>
+            </a:pPr>
+            <a:r>
+              <a:rPr lang="fr-FR" sz="3200" dirty="0"/>
+              <a:t>Jenkins / </a:t>
+            </a:r>
+            <a:r>
+              <a:rPr lang="fr-FR" sz="3200" dirty="0" err="1"/>
+              <a:t>ArgoCD</a:t>
+            </a:r>
+            <a:r>
+              <a:rPr lang="fr-FR" sz="3200" dirty="0"/>
+              <a:t> / </a:t>
+            </a:r>
+            <a:r>
+              <a:rPr lang="fr-FR" sz="3200" dirty="0" err="1"/>
+              <a:t>Kubernetes</a:t>
+            </a:r>
+            <a:endParaRPr lang="en-US" sz="3200" dirty="0"/>
+          </a:p>
+        </p:txBody>
+      </p:sp>
+      <p:sp>
+        <p:nvSpPr>
+          <p:cNvPr id="4" name="Espace réservé de la date 3">
+            <a:extLst>
+              <a:ext uri="{FF2B5EF4-FFF2-40B4-BE49-F238E27FC236}">
+                <a16:creationId xmlns:a16="http://schemas.microsoft.com/office/drawing/2014/main" id="{75AC20C1-4DA3-91E8-9CA6-A5C430556502}"/>
+              </a:ext>
+            </a:extLst>
+          </p:cNvPr>
+          <p:cNvSpPr>
+            <a:spLocks noGrp="1"/>
+          </p:cNvSpPr>
+          <p:nvPr>
+            <p:ph type="dt" sz="half" idx="10"/>
+          </p:nvPr>
+        </p:nvSpPr>
+        <p:spPr/>
+        <p:txBody>
+          <a:bodyPr/>
+          <a:lstStyle/>
+          <a:p>
+            <a:r>
+              <a:rPr lang="en-US"/>
+              <a:t>2024</a:t>
+            </a:r>
+            <a:endParaRPr lang="en-US" dirty="0"/>
+          </a:p>
+        </p:txBody>
+      </p:sp>
+      <p:sp>
+        <p:nvSpPr>
+          <p:cNvPr id="5" name="Espace réservé du pied de page 4">
+            <a:extLst>
+              <a:ext uri="{FF2B5EF4-FFF2-40B4-BE49-F238E27FC236}">
+                <a16:creationId xmlns:a16="http://schemas.microsoft.com/office/drawing/2014/main" id="{70F301A9-D6AB-F9B2-CE98-20FF81F255E8}"/>
+              </a:ext>
+            </a:extLst>
+          </p:cNvPr>
+          <p:cNvSpPr>
+            <a:spLocks noGrp="1"/>
+          </p:cNvSpPr>
+          <p:nvPr>
+            <p:ph type="ftr" sz="quarter" idx="11"/>
+          </p:nvPr>
+        </p:nvSpPr>
+        <p:spPr/>
+        <p:txBody>
+          <a:bodyPr/>
+          <a:lstStyle/>
+          <a:p>
+            <a:r>
+              <a:rPr lang="en-US"/>
+              <a:t>Projet classification de documents</a:t>
+            </a:r>
+            <a:endParaRPr lang="en-US" dirty="0"/>
+          </a:p>
+        </p:txBody>
+      </p:sp>
+      <p:sp>
+        <p:nvSpPr>
+          <p:cNvPr id="6" name="Espace réservé du numéro de diapositive 5">
+            <a:extLst>
+              <a:ext uri="{FF2B5EF4-FFF2-40B4-BE49-F238E27FC236}">
+                <a16:creationId xmlns:a16="http://schemas.microsoft.com/office/drawing/2014/main" id="{B8115CB3-FAE1-5DCF-5268-79EE0048FF8C}"/>
+              </a:ext>
+            </a:extLst>
+          </p:cNvPr>
+          <p:cNvSpPr>
+            <a:spLocks noGrp="1"/>
+          </p:cNvSpPr>
+          <p:nvPr>
+            <p:ph type="sldNum" sz="quarter" idx="12"/>
+          </p:nvPr>
+        </p:nvSpPr>
+        <p:spPr/>
+        <p:txBody>
+          <a:bodyPr/>
+          <a:lstStyle/>
+          <a:p>
+            <a:fld id="{B5CEABB6-07DC-46E8-9B57-56EC44A396E5}" type="slidenum">
+              <a:rPr lang="en-US" smtClean="0"/>
+              <a:t>26</a:t>
+            </a:fld>
+            <a:endParaRPr lang="en-US" dirty="0"/>
+          </a:p>
+        </p:txBody>
+      </p:sp>
+    </p:spTree>
+    <p:extLst>
+      <p:ext uri="{BB962C8B-B14F-4D97-AF65-F5344CB8AC3E}">
+        <p14:creationId xmlns:p14="http://schemas.microsoft.com/office/powerpoint/2010/main" val="1261785181"/>
+      </p:ext>
+    </p:extLst>
+  </p:cSld>
+  <p:clrMapOvr>
+    <a:masterClrMapping/>
+  </p:clrMapOvr>
+</p:sld>
+</file>
+
 <file path=ppt/slides/slide3.xml><?xml version="1.0" encoding="utf-8"?>
 <p:sld xmlns:a="http://schemas.openxmlformats.org/drawingml/2006/main" xmlns:r="http://schemas.openxmlformats.org/officeDocument/2006/relationships" xmlns:p="http://schemas.openxmlformats.org/presentationml/2006/main">
   <p:cSld>
@@ -37431,7 +37696,7 @@
                                           </p:stCondLst>
                                         </p:cTn>
                                         <p:tgtEl>
-                                          <p:spTgt spid="1024"/>
+                                          <p:spTgt spid="33"/>
                                         </p:tgtEl>
                                         <p:attrNameLst>
                                           <p:attrName>style.visibility</p:attrName>
@@ -37445,7 +37710,7 @@
                                 </p:cTn>
                               </p:par>
                               <p:par>
-                                <p:cTn id="7" presetID="1" presetClass="entr" presetSubtype="0" fill="hold" nodeType="withEffect">
+                                <p:cTn id="7" presetID="1" presetClass="entr" presetSubtype="0" fill="hold" grpId="0" nodeType="withEffect">
                                   <p:stCondLst>
                                     <p:cond delay="0"/>
                                   </p:stCondLst>
@@ -37458,7 +37723,7 @@
                                           </p:stCondLst>
                                         </p:cTn>
                                         <p:tgtEl>
-                                          <p:spTgt spid="1056"/>
+                                          <p:spTgt spid="42"/>
                                         </p:tgtEl>
                                         <p:attrNameLst>
                                           <p:attrName>style.visibility</p:attrName>
@@ -37503,7 +37768,7 @@
                                           </p:stCondLst>
                                         </p:cTn>
                                         <p:tgtEl>
-                                          <p:spTgt spid="1067"/>
+                                          <p:spTgt spid="1024"/>
                                         </p:tgtEl>
                                         <p:attrNameLst>
                                           <p:attrName>style.visibility</p:attrName>
@@ -37530,7 +37795,7 @@
                                           </p:stCondLst>
                                         </p:cTn>
                                         <p:tgtEl>
-                                          <p:spTgt spid="1069"/>
+                                          <p:spTgt spid="1056"/>
                                         </p:tgtEl>
                                         <p:attrNameLst>
                                           <p:attrName>style.visibility</p:attrName>
@@ -37575,7 +37840,7 @@
                                           </p:stCondLst>
                                         </p:cTn>
                                         <p:tgtEl>
-                                          <p:spTgt spid="1028"/>
+                                          <p:spTgt spid="1067"/>
                                         </p:tgtEl>
                                         <p:attrNameLst>
                                           <p:attrName>style.visibility</p:attrName>
@@ -37589,7 +37854,7 @@
                                 </p:cTn>
                               </p:par>
                               <p:par>
-                                <p:cTn id="19" presetID="1" presetClass="entr" presetSubtype="0" fill="hold" grpId="0" nodeType="withEffect">
+                                <p:cTn id="19" presetID="1" presetClass="entr" presetSubtype="0" fill="hold" nodeType="withEffect">
                                   <p:stCondLst>
                                     <p:cond delay="0"/>
                                   </p:stCondLst>
@@ -37602,7 +37867,7 @@
                                           </p:stCondLst>
                                         </p:cTn>
                                         <p:tgtEl>
-                                          <p:spTgt spid="16"/>
+                                          <p:spTgt spid="1069"/>
                                         </p:tgtEl>
                                         <p:attrNameLst>
                                           <p:attrName>style.visibility</p:attrName>
@@ -37634,7 +37899,7 @@
                             </p:stCondLst>
                             <p:childTnLst>
                               <p:par>
-                                <p:cTn id="23" presetID="1" presetClass="entr" presetSubtype="0" fill="hold" grpId="0" nodeType="clickEffect">
+                                <p:cTn id="23" presetID="1" presetClass="entr" presetSubtype="0" fill="hold" nodeType="clickEffect">
                                   <p:stCondLst>
                                     <p:cond delay="0"/>
                                   </p:stCondLst>
@@ -37647,7 +37912,7 @@
                                           </p:stCondLst>
                                         </p:cTn>
                                         <p:tgtEl>
-                                          <p:spTgt spid="1032"/>
+                                          <p:spTgt spid="1028"/>
                                         </p:tgtEl>
                                         <p:attrNameLst>
                                           <p:attrName>style.visibility</p:attrName>
@@ -37661,7 +37926,7 @@
                                 </p:cTn>
                               </p:par>
                               <p:par>
-                                <p:cTn id="25" presetID="1" presetClass="entr" presetSubtype="0" fill="hold" nodeType="withEffect">
+                                <p:cTn id="25" presetID="1" presetClass="entr" presetSubtype="0" fill="hold" grpId="0" nodeType="withEffect">
                                   <p:stCondLst>
                                     <p:cond delay="0"/>
                                   </p:stCondLst>
@@ -37674,7 +37939,34 @@
                                           </p:stCondLst>
                                         </p:cTn>
                                         <p:tgtEl>
-                                          <p:spTgt spid="1072"/>
+                                          <p:spTgt spid="16"/>
+                                        </p:tgtEl>
+                                        <p:attrNameLst>
+                                          <p:attrName>style.visibility</p:attrName>
+                                        </p:attrNameLst>
+                                      </p:cBhvr>
+                                      <p:to>
+                                        <p:strVal val="visible"/>
+                                      </p:to>
+                                    </p:set>
+                                  </p:childTnLst>
+                                </p:cTn>
+                              </p:par>
+                              <p:par>
+                                <p:cTn id="27" presetID="1" presetClass="entr" presetSubtype="0" fill="hold" nodeType="withEffect">
+                                  <p:stCondLst>
+                                    <p:cond delay="0"/>
+                                  </p:stCondLst>
+                                  <p:childTnLst>
+                                    <p:set>
+                                      <p:cBhvr>
+                                        <p:cTn id="28" dur="1" fill="hold">
+                                          <p:stCondLst>
+                                            <p:cond delay="0"/>
+                                          </p:stCondLst>
+                                        </p:cTn>
+                                        <p:tgtEl>
+                                          <p:spTgt spid="13"/>
                                         </p:tgtEl>
                                         <p:attrNameLst>
                                           <p:attrName>style.visibility</p:attrName>
@@ -37694,46 +37986,19 @@
                     </p:cTn>
                   </p:par>
                   <p:par>
-                    <p:cTn id="27" fill="hold">
+                    <p:cTn id="29" fill="hold">
                       <p:stCondLst>
                         <p:cond delay="indefinite"/>
                       </p:stCondLst>
                       <p:childTnLst>
                         <p:par>
-                          <p:cTn id="28" fill="hold">
+                          <p:cTn id="30" fill="hold">
                             <p:stCondLst>
                               <p:cond delay="0"/>
                             </p:stCondLst>
                             <p:childTnLst>
                               <p:par>
-                                <p:cTn id="29" presetID="1" presetClass="entr" presetSubtype="0" fill="hold" nodeType="clickEffect">
-                                  <p:stCondLst>
-                                    <p:cond delay="0"/>
-                                  </p:stCondLst>
-                                  <p:childTnLst>
-                                    <p:set>
-                                      <p:cBhvr>
-                                        <p:cTn id="30" dur="1" fill="hold">
-                                          <p:stCondLst>
-                                            <p:cond delay="0"/>
-                                          </p:stCondLst>
-                                        </p:cTn>
-                                        <p:tgtEl>
-                                          <p:spTgt spid="43"/>
-                                        </p:tgtEl>
-                                        <p:attrNameLst>
-                                          <p:attrName>style.visibility</p:attrName>
-                                        </p:attrNameLst>
-                                      </p:cBhvr>
-                                      <p:to>
-                                        <p:strVal val="visible"/>
-                                      </p:to>
-                                    </p:set>
-                                  </p:childTnLst>
-                                </p:cTn>
-                              </p:par>
-                              <p:par>
-                                <p:cTn id="31" presetID="1" presetClass="entr" presetSubtype="0" fill="hold" grpId="0" nodeType="withEffect">
+                                <p:cTn id="31" presetID="1" presetClass="entr" presetSubtype="0" fill="hold" grpId="0" nodeType="clickEffect">
                                   <p:stCondLst>
                                     <p:cond delay="0"/>
                                   </p:stCondLst>
@@ -37746,7 +38011,7 @@
                                           </p:stCondLst>
                                         </p:cTn>
                                         <p:tgtEl>
-                                          <p:spTgt spid="40"/>
+                                          <p:spTgt spid="1032"/>
                                         </p:tgtEl>
                                         <p:attrNameLst>
                                           <p:attrName>style.visibility</p:attrName>
@@ -37773,7 +38038,7 @@
                                           </p:stCondLst>
                                         </p:cTn>
                                         <p:tgtEl>
-                                          <p:spTgt spid="36"/>
+                                          <p:spTgt spid="1072"/>
                                         </p:tgtEl>
                                         <p:attrNameLst>
                                           <p:attrName>style.visibility</p:attrName>
@@ -37818,6 +38083,105 @@
                                           </p:stCondLst>
                                         </p:cTn>
                                         <p:tgtEl>
+                                          <p:spTgt spid="43"/>
+                                        </p:tgtEl>
+                                        <p:attrNameLst>
+                                          <p:attrName>style.visibility</p:attrName>
+                                        </p:attrNameLst>
+                                      </p:cBhvr>
+                                      <p:to>
+                                        <p:strVal val="visible"/>
+                                      </p:to>
+                                    </p:set>
+                                  </p:childTnLst>
+                                </p:cTn>
+                              </p:par>
+                              <p:par>
+                                <p:cTn id="39" presetID="1" presetClass="entr" presetSubtype="0" fill="hold" grpId="0" nodeType="withEffect">
+                                  <p:stCondLst>
+                                    <p:cond delay="0"/>
+                                  </p:stCondLst>
+                                  <p:childTnLst>
+                                    <p:set>
+                                      <p:cBhvr>
+                                        <p:cTn id="40" dur="1" fill="hold">
+                                          <p:stCondLst>
+                                            <p:cond delay="0"/>
+                                          </p:stCondLst>
+                                        </p:cTn>
+                                        <p:tgtEl>
+                                          <p:spTgt spid="40"/>
+                                        </p:tgtEl>
+                                        <p:attrNameLst>
+                                          <p:attrName>style.visibility</p:attrName>
+                                        </p:attrNameLst>
+                                      </p:cBhvr>
+                                      <p:to>
+                                        <p:strVal val="visible"/>
+                                      </p:to>
+                                    </p:set>
+                                  </p:childTnLst>
+                                </p:cTn>
+                              </p:par>
+                              <p:par>
+                                <p:cTn id="41" presetID="1" presetClass="entr" presetSubtype="0" fill="hold" nodeType="withEffect">
+                                  <p:stCondLst>
+                                    <p:cond delay="0"/>
+                                  </p:stCondLst>
+                                  <p:childTnLst>
+                                    <p:set>
+                                      <p:cBhvr>
+                                        <p:cTn id="42" dur="1" fill="hold">
+                                          <p:stCondLst>
+                                            <p:cond delay="0"/>
+                                          </p:stCondLst>
+                                        </p:cTn>
+                                        <p:tgtEl>
+                                          <p:spTgt spid="36"/>
+                                        </p:tgtEl>
+                                        <p:attrNameLst>
+                                          <p:attrName>style.visibility</p:attrName>
+                                        </p:attrNameLst>
+                                      </p:cBhvr>
+                                      <p:to>
+                                        <p:strVal val="visible"/>
+                                      </p:to>
+                                    </p:set>
+                                  </p:childTnLst>
+                                </p:cTn>
+                              </p:par>
+                            </p:childTnLst>
+                          </p:cTn>
+                        </p:par>
+                      </p:childTnLst>
+                    </p:cTn>
+                  </p:par>
+                  <p:par>
+                    <p:cTn id="43" fill="hold">
+                      <p:stCondLst>
+                        <p:cond delay="indefinite"/>
+                      </p:stCondLst>
+                      <p:childTnLst>
+                        <p:par>
+                          <p:cTn id="44" fill="hold">
+                            <p:stCondLst>
+                              <p:cond delay="0"/>
+                            </p:stCondLst>
+                            <p:childTnLst>
+                              <p:par>
+                                <p:cTn id="45" presetID="1" presetClass="entr" presetSubtype="0" fill="hold" nodeType="clickEffect">
+                                  <p:stCondLst>
+                                    <p:cond delay="0"/>
+                                  </p:stCondLst>
+                                  <p:childTnLst>
+                                    <p:set>
+                                      <p:cBhvr>
+                                        <p:cTn id="46" dur="1" fill="hold">
+                                          <p:stCondLst>
+                                            <p:cond delay="0"/>
+                                          </p:stCondLst>
+                                        </p:cTn>
+                                        <p:tgtEl>
                                           <p:spTgt spid="1068"/>
                                         </p:tgtEl>
                                         <p:attrNameLst>
@@ -37832,14 +38196,14 @@
                                 </p:cTn>
                               </p:par>
                               <p:par>
-                                <p:cTn id="39" presetID="1" presetClass="entr" presetSubtype="0" fill="hold" nodeType="withEffect">
+                                <p:cTn id="47" presetID="1" presetClass="entr" presetSubtype="0" fill="hold" nodeType="withEffect">
                                   <p:stCondLst>
                                     <p:cond delay="0"/>
                                   </p:stCondLst>
                                   <p:childTnLst>
                                     <p:set>
                                       <p:cBhvr>
-                                        <p:cTn id="40" dur="1" fill="hold">
+                                        <p:cTn id="48" dur="1" fill="hold">
                                           <p:stCondLst>
                                             <p:cond delay="0"/>
                                           </p:stCondLst>
@@ -37865,26 +38229,26 @@
                     </p:cTn>
                   </p:par>
                   <p:par>
-                    <p:cTn id="41" fill="hold">
+                    <p:cTn id="49" fill="hold">
                       <p:stCondLst>
                         <p:cond delay="indefinite"/>
                       </p:stCondLst>
                       <p:childTnLst>
                         <p:par>
-                          <p:cTn id="42" fill="hold">
+                          <p:cTn id="50" fill="hold">
                             <p:stCondLst>
                               <p:cond delay="0"/>
                             </p:stCondLst>
                             <p:childTnLst>
                               <p:par>
-                                <p:cTn id="43" presetID="1" presetClass="entr" presetSubtype="0" fill="hold" nodeType="clickEffect">
+                                <p:cTn id="51" presetID="1" presetClass="entr" presetSubtype="0" fill="hold" nodeType="clickEffect">
                                   <p:stCondLst>
                                     <p:cond delay="0"/>
                                   </p:stCondLst>
                                   <p:childTnLst>
                                     <p:set>
                                       <p:cBhvr>
-                                        <p:cTn id="44" dur="1" fill="hold">
+                                        <p:cTn id="52" dur="1" fill="hold">
                                           <p:stCondLst>
                                             <p:cond delay="0"/>
                                           </p:stCondLst>
@@ -37904,14 +38268,14 @@
                                 </p:cTn>
                               </p:par>
                               <p:par>
-                                <p:cTn id="45" presetID="1" presetClass="entr" presetSubtype="0" fill="hold" grpId="0" nodeType="withEffect">
+                                <p:cTn id="53" presetID="1" presetClass="entr" presetSubtype="0" fill="hold" grpId="0" nodeType="withEffect">
                                   <p:stCondLst>
                                     <p:cond delay="0"/>
                                   </p:stCondLst>
                                   <p:childTnLst>
                                     <p:set>
                                       <p:cBhvr>
-                                        <p:cTn id="46" dur="1" fill="hold">
+                                        <p:cTn id="54" dur="1" fill="hold">
                                           <p:stCondLst>
                                             <p:cond delay="0"/>
                                           </p:stCondLst>
@@ -37937,26 +38301,26 @@
                     </p:cTn>
                   </p:par>
                   <p:par>
-                    <p:cTn id="47" fill="hold">
+                    <p:cTn id="55" fill="hold">
                       <p:stCondLst>
                         <p:cond delay="indefinite"/>
                       </p:stCondLst>
                       <p:childTnLst>
                         <p:par>
-                          <p:cTn id="48" fill="hold">
+                          <p:cTn id="56" fill="hold">
                             <p:stCondLst>
                               <p:cond delay="0"/>
                             </p:stCondLst>
                             <p:childTnLst>
                               <p:par>
-                                <p:cTn id="49" presetID="1" presetClass="entr" presetSubtype="0" fill="hold" nodeType="clickEffect">
+                                <p:cTn id="57" presetID="26" presetClass="entr" presetSubtype="0" fill="hold" nodeType="clickEffect">
                                   <p:stCondLst>
                                     <p:cond delay="0"/>
                                   </p:stCondLst>
                                   <p:childTnLst>
                                     <p:set>
                                       <p:cBhvr>
-                                        <p:cTn id="50" dur="1" fill="hold">
+                                        <p:cTn id="58" dur="1" fill="hold">
                                           <p:stCondLst>
                                             <p:cond delay="0"/>
                                           </p:stCondLst>
@@ -37972,6 +38336,257 @@
                                         <p:strVal val="visible"/>
                                       </p:to>
                                     </p:set>
+                                    <p:animEffect transition="in" filter="wipe(down)">
+                                      <p:cBhvr>
+                                        <p:cTn id="59" dur="580">
+                                          <p:stCondLst>
+                                            <p:cond delay="0"/>
+                                          </p:stCondLst>
+                                        </p:cTn>
+                                        <p:tgtEl>
+                                          <p:spTgt spid="1053"/>
+                                        </p:tgtEl>
+                                      </p:cBhvr>
+                                    </p:animEffect>
+                                    <p:anim calcmode="lin" valueType="num">
+                                      <p:cBhvr>
+                                        <p:cTn id="60" dur="1822" tmFilter="0,0; 0.14,0.36; 0.43,0.73; 0.71,0.91; 1.0,1.0">
+                                          <p:stCondLst>
+                                            <p:cond delay="0"/>
+                                          </p:stCondLst>
+                                        </p:cTn>
+                                        <p:tgtEl>
+                                          <p:spTgt spid="1053"/>
+                                        </p:tgtEl>
+                                        <p:attrNameLst>
+                                          <p:attrName>ppt_x</p:attrName>
+                                        </p:attrNameLst>
+                                      </p:cBhvr>
+                                      <p:tavLst>
+                                        <p:tav tm="0">
+                                          <p:val>
+                                            <p:strVal val="#ppt_x-0.25"/>
+                                          </p:val>
+                                        </p:tav>
+                                        <p:tav tm="100000">
+                                          <p:val>
+                                            <p:strVal val="#ppt_x"/>
+                                          </p:val>
+                                        </p:tav>
+                                      </p:tavLst>
+                                    </p:anim>
+                                    <p:anim calcmode="lin" valueType="num">
+                                      <p:cBhvr>
+                                        <p:cTn id="61" dur="664" tmFilter="0.0,0.0; 0.25,0.07; 0.50,0.2; 0.75,0.467; 1.0,1.0">
+                                          <p:stCondLst>
+                                            <p:cond delay="0"/>
+                                          </p:stCondLst>
+                                        </p:cTn>
+                                        <p:tgtEl>
+                                          <p:spTgt spid="1053"/>
+                                        </p:tgtEl>
+                                        <p:attrNameLst>
+                                          <p:attrName>ppt_y</p:attrName>
+                                        </p:attrNameLst>
+                                      </p:cBhvr>
+                                      <p:tavLst>
+                                        <p:tav tm="0" fmla="#ppt_y-sin(pi*$)/3">
+                                          <p:val>
+                                            <p:fltVal val="0.5"/>
+                                          </p:val>
+                                        </p:tav>
+                                        <p:tav tm="100000">
+                                          <p:val>
+                                            <p:fltVal val="1"/>
+                                          </p:val>
+                                        </p:tav>
+                                      </p:tavLst>
+                                    </p:anim>
+                                    <p:anim calcmode="lin" valueType="num">
+                                      <p:cBhvr>
+                                        <p:cTn id="62" dur="664" tmFilter="0, 0; 0.125,0.2665; 0.25,0.4; 0.375,0.465; 0.5,0.5;  0.625,0.535; 0.75,0.6; 0.875,0.7335; 1,1">
+                                          <p:stCondLst>
+                                            <p:cond delay="664"/>
+                                          </p:stCondLst>
+                                        </p:cTn>
+                                        <p:tgtEl>
+                                          <p:spTgt spid="1053"/>
+                                        </p:tgtEl>
+                                        <p:attrNameLst>
+                                          <p:attrName>ppt_y</p:attrName>
+                                        </p:attrNameLst>
+                                      </p:cBhvr>
+                                      <p:tavLst>
+                                        <p:tav tm="0" fmla="#ppt_y-sin(pi*$)/9">
+                                          <p:val>
+                                            <p:fltVal val="0"/>
+                                          </p:val>
+                                        </p:tav>
+                                        <p:tav tm="100000">
+                                          <p:val>
+                                            <p:fltVal val="1"/>
+                                          </p:val>
+                                        </p:tav>
+                                      </p:tavLst>
+                                    </p:anim>
+                                    <p:anim calcmode="lin" valueType="num">
+                                      <p:cBhvr>
+                                        <p:cTn id="63" dur="332" tmFilter="0, 0; 0.125,0.2665; 0.25,0.4; 0.375,0.465; 0.5,0.5;  0.625,0.535; 0.75,0.6; 0.875,0.7335; 1,1">
+                                          <p:stCondLst>
+                                            <p:cond delay="1324"/>
+                                          </p:stCondLst>
+                                        </p:cTn>
+                                        <p:tgtEl>
+                                          <p:spTgt spid="1053"/>
+                                        </p:tgtEl>
+                                        <p:attrNameLst>
+                                          <p:attrName>ppt_y</p:attrName>
+                                        </p:attrNameLst>
+                                      </p:cBhvr>
+                                      <p:tavLst>
+                                        <p:tav tm="0" fmla="#ppt_y-sin(pi*$)/27">
+                                          <p:val>
+                                            <p:fltVal val="0"/>
+                                          </p:val>
+                                        </p:tav>
+                                        <p:tav tm="100000">
+                                          <p:val>
+                                            <p:fltVal val="1"/>
+                                          </p:val>
+                                        </p:tav>
+                                      </p:tavLst>
+                                    </p:anim>
+                                    <p:anim calcmode="lin" valueType="num">
+                                      <p:cBhvr>
+                                        <p:cTn id="64" dur="164" tmFilter="0, 0; 0.125,0.2665; 0.25,0.4; 0.375,0.465; 0.5,0.5;  0.625,0.535; 0.75,0.6; 0.875,0.7335; 1,1">
+                                          <p:stCondLst>
+                                            <p:cond delay="1656"/>
+                                          </p:stCondLst>
+                                        </p:cTn>
+                                        <p:tgtEl>
+                                          <p:spTgt spid="1053"/>
+                                        </p:tgtEl>
+                                        <p:attrNameLst>
+                                          <p:attrName>ppt_y</p:attrName>
+                                        </p:attrNameLst>
+                                      </p:cBhvr>
+                                      <p:tavLst>
+                                        <p:tav tm="0" fmla="#ppt_y-sin(pi*$)/81">
+                                          <p:val>
+                                            <p:fltVal val="0"/>
+                                          </p:val>
+                                        </p:tav>
+                                        <p:tav tm="100000">
+                                          <p:val>
+                                            <p:fltVal val="1"/>
+                                          </p:val>
+                                        </p:tav>
+                                      </p:tavLst>
+                                    </p:anim>
+                                    <p:animScale>
+                                      <p:cBhvr>
+                                        <p:cTn id="65" dur="26">
+                                          <p:stCondLst>
+                                            <p:cond delay="650"/>
+                                          </p:stCondLst>
+                                        </p:cTn>
+                                        <p:tgtEl>
+                                          <p:spTgt spid="1053"/>
+                                        </p:tgtEl>
+                                      </p:cBhvr>
+                                      <p:to x="100000" y="60000"/>
+                                    </p:animScale>
+                                    <p:animScale>
+                                      <p:cBhvr>
+                                        <p:cTn id="66" dur="166" decel="50000">
+                                          <p:stCondLst>
+                                            <p:cond delay="676"/>
+                                          </p:stCondLst>
+                                        </p:cTn>
+                                        <p:tgtEl>
+                                          <p:spTgt spid="1053"/>
+                                        </p:tgtEl>
+                                      </p:cBhvr>
+                                      <p:to x="100000" y="100000"/>
+                                    </p:animScale>
+                                    <p:animScale>
+                                      <p:cBhvr>
+                                        <p:cTn id="67" dur="26">
+                                          <p:stCondLst>
+                                            <p:cond delay="1312"/>
+                                          </p:stCondLst>
+                                        </p:cTn>
+                                        <p:tgtEl>
+                                          <p:spTgt spid="1053"/>
+                                        </p:tgtEl>
+                                      </p:cBhvr>
+                                      <p:to x="100000" y="80000"/>
+                                    </p:animScale>
+                                    <p:animScale>
+                                      <p:cBhvr>
+                                        <p:cTn id="68" dur="166" decel="50000">
+                                          <p:stCondLst>
+                                            <p:cond delay="1338"/>
+                                          </p:stCondLst>
+                                        </p:cTn>
+                                        <p:tgtEl>
+                                          <p:spTgt spid="1053"/>
+                                        </p:tgtEl>
+                                      </p:cBhvr>
+                                      <p:to x="100000" y="100000"/>
+                                    </p:animScale>
+                                    <p:animScale>
+                                      <p:cBhvr>
+                                        <p:cTn id="69" dur="26">
+                                          <p:stCondLst>
+                                            <p:cond delay="1642"/>
+                                          </p:stCondLst>
+                                        </p:cTn>
+                                        <p:tgtEl>
+                                          <p:spTgt spid="1053"/>
+                                        </p:tgtEl>
+                                      </p:cBhvr>
+                                      <p:to x="100000" y="90000"/>
+                                    </p:animScale>
+                                    <p:animScale>
+                                      <p:cBhvr>
+                                        <p:cTn id="70" dur="166" decel="50000">
+                                          <p:stCondLst>
+                                            <p:cond delay="1668"/>
+                                          </p:stCondLst>
+                                        </p:cTn>
+                                        <p:tgtEl>
+                                          <p:spTgt spid="1053"/>
+                                        </p:tgtEl>
+                                      </p:cBhvr>
+                                      <p:to x="100000" y="100000"/>
+                                    </p:animScale>
+                                    <p:animScale>
+                                      <p:cBhvr>
+                                        <p:cTn id="71" dur="26">
+                                          <p:stCondLst>
+                                            <p:cond delay="1808"/>
+                                          </p:stCondLst>
+                                        </p:cTn>
+                                        <p:tgtEl>
+                                          <p:spTgt spid="1053"/>
+                                        </p:tgtEl>
+                                      </p:cBhvr>
+                                      <p:to x="100000" y="95000"/>
+                                    </p:animScale>
+                                    <p:animScale>
+                                      <p:cBhvr>
+                                        <p:cTn id="72" dur="166" decel="50000">
+                                          <p:stCondLst>
+                                            <p:cond delay="1834"/>
+                                          </p:stCondLst>
+                                        </p:cTn>
+                                        <p:tgtEl>
+                                          <p:spTgt spid="1053"/>
+                                        </p:tgtEl>
+                                      </p:cBhvr>
+                                      <p:to x="100000" y="100000"/>
+                                    </p:animScale>
                                   </p:childTnLst>
                                 </p:cTn>
                               </p:par>
@@ -38006,6 +38621,7 @@
       <p:bldP spid="16" grpId="0" animBg="1"/>
       <p:bldP spid="40" grpId="0" animBg="1"/>
       <p:bldP spid="41" grpId="0" animBg="1"/>
+      <p:bldP spid="42" grpId="0" animBg="1"/>
       <p:bldP spid="1032" grpId="0" animBg="1"/>
     </p:bldLst>
   </p:timing>
@@ -39670,13 +40286,20 @@
           <a:p>
             <a:r>
               <a:rPr lang="fr-FR" b="1" dirty="0"/>
-              <a:t>Pipeline Training &amp; Monitoring (Time </a:t>
-            </a:r>
-            <a:r>
-              <a:rPr lang="fr-FR" b="1"/>
-              <a:t>8 minutes)</a:t>
-            </a:r>
-            <a:endParaRPr lang="fr-FR" b="1" dirty="0"/>
+              <a:t>Pipeline Training &amp; Monitoring </a:t>
+            </a:r>
+            <a:r>
+              <a:rPr lang="fr-FR" dirty="0"/>
+              <a:t>(</a:t>
+            </a:r>
+            <a:r>
+              <a:rPr lang="fr-FR" dirty="0" err="1"/>
+              <a:t>Remain</a:t>
+            </a:r>
+            <a:r>
+              <a:rPr lang="fr-FR" dirty="0"/>
+              <a:t> 12 minutes)</a:t>
+            </a:r>
           </a:p>
           <a:p>
             <a:r>
@@ -39693,18 +40316,7 @@
               <a:rPr lang="fr-FR" dirty="0" err="1"/>
               <a:t>MLOps</a:t>
             </a:r>
-            <a:r>
-              <a:rPr lang="fr-FR" dirty="0"/>
-              <a:t> (CI/CD, </a:t>
-            </a:r>
-            <a:r>
-              <a:rPr lang="fr-FR" dirty="0" err="1"/>
-              <a:t>Kubernetes</a:t>
-            </a:r>
-            <a:r>
-              <a:rPr lang="fr-FR" dirty="0"/>
-              <a:t>, Sécurisation)</a:t>
-            </a:r>
+            <a:endParaRPr lang="fr-FR" dirty="0"/>
           </a:p>
         </p:txBody>
       </p:sp>

</xml_diff>